<commit_message>
plan de despliegue y correcciones ppt
</commit_message>
<xml_diff>
--- a/Documentacion/Proyecto/ExposicionRegularidad.pptx
+++ b/Documentacion/Proyecto/ExposicionRegularidad.pptx
@@ -207,7 +207,7 @@
             <a:fld id="{FEFD30D0-0048-42BF-B88B-21F996E0C231}" type="datetimeFigureOut">
               <a:rPr lang="en-US" smtClean="0"/>
               <a:pPr/>
-              <a:t>10/30/2012</a:t>
+              <a:t>10/31/2012</a:t>
             </a:fld>
             <a:endParaRPr lang="en-US"/>
           </a:p>
@@ -4464,7 +4464,7 @@
             <a:fld id="{46F4E5E0-CC8A-4447-8D98-8F21A5814697}" type="datetimeFigureOut">
               <a:rPr lang="en-US" smtClean="0"/>
               <a:pPr/>
-              <a:t>10/30/2012</a:t>
+              <a:t>10/31/2012</a:t>
             </a:fld>
             <a:endParaRPr lang="en-US"/>
           </a:p>
@@ -4751,7 +4751,7 @@
             <a:fld id="{46F4E5E0-CC8A-4447-8D98-8F21A5814697}" type="datetimeFigureOut">
               <a:rPr lang="en-US" smtClean="0"/>
               <a:pPr/>
-              <a:t>10/30/2012</a:t>
+              <a:t>10/31/2012</a:t>
             </a:fld>
             <a:endParaRPr lang="en-US"/>
           </a:p>
@@ -4928,7 +4928,7 @@
             <a:fld id="{46F4E5E0-CC8A-4447-8D98-8F21A5814697}" type="datetimeFigureOut">
               <a:rPr lang="en-US" smtClean="0"/>
               <a:pPr/>
-              <a:t>10/30/2012</a:t>
+              <a:t>10/31/2012</a:t>
             </a:fld>
             <a:endParaRPr lang="en-US"/>
           </a:p>
@@ -5095,7 +5095,7 @@
             <a:fld id="{46F4E5E0-CC8A-4447-8D98-8F21A5814697}" type="datetimeFigureOut">
               <a:rPr lang="en-US" smtClean="0"/>
               <a:pPr/>
-              <a:t>10/30/2012</a:t>
+              <a:t>10/31/2012</a:t>
             </a:fld>
             <a:endParaRPr lang="en-US"/>
           </a:p>
@@ -5338,7 +5338,7 @@
             <a:fld id="{46F4E5E0-CC8A-4447-8D98-8F21A5814697}" type="datetimeFigureOut">
               <a:rPr lang="en-US" smtClean="0"/>
               <a:pPr/>
-              <a:t>10/30/2012</a:t>
+              <a:t>10/31/2012</a:t>
             </a:fld>
             <a:endParaRPr lang="en-US"/>
           </a:p>
@@ -5453,7 +5453,7 @@
             <a:fld id="{46F4E5E0-CC8A-4447-8D98-8F21A5814697}" type="datetimeFigureOut">
               <a:rPr lang="en-US" smtClean="0"/>
               <a:pPr/>
-              <a:t>10/30/2012</a:t>
+              <a:t>10/31/2012</a:t>
             </a:fld>
             <a:endParaRPr lang="en-US"/>
           </a:p>
@@ -5994,7 +5994,7 @@
             <a:fld id="{46F4E5E0-CC8A-4447-8D98-8F21A5814697}" type="datetimeFigureOut">
               <a:rPr lang="en-US" smtClean="0"/>
               <a:pPr/>
-              <a:t>10/30/2012</a:t>
+              <a:t>10/31/2012</a:t>
             </a:fld>
             <a:endParaRPr lang="en-US"/>
           </a:p>
@@ -6109,7 +6109,7 @@
             <a:fld id="{46F4E5E0-CC8A-4447-8D98-8F21A5814697}" type="datetimeFigureOut">
               <a:rPr lang="en-US" smtClean="0"/>
               <a:pPr/>
-              <a:t>10/30/2012</a:t>
+              <a:t>10/31/2012</a:t>
             </a:fld>
             <a:endParaRPr lang="en-US"/>
           </a:p>
@@ -6201,7 +6201,7 @@
             <a:fld id="{46F4E5E0-CC8A-4447-8D98-8F21A5814697}" type="datetimeFigureOut">
               <a:rPr lang="en-US" smtClean="0"/>
               <a:pPr/>
-              <a:t>10/30/2012</a:t>
+              <a:t>10/31/2012</a:t>
             </a:fld>
             <a:endParaRPr lang="en-US"/>
           </a:p>
@@ -8854,7 +8854,7 @@
             <a:fld id="{46F4E5E0-CC8A-4447-8D98-8F21A5814697}" type="datetimeFigureOut">
               <a:rPr lang="en-US" smtClean="0"/>
               <a:pPr/>
-              <a:t>10/30/2012</a:t>
+              <a:t>10/31/2012</a:t>
             </a:fld>
             <a:endParaRPr lang="en-US"/>
           </a:p>
@@ -12068,7 +12068,7 @@
             <a:fld id="{46F4E5E0-CC8A-4447-8D98-8F21A5814697}" type="datetimeFigureOut">
               <a:rPr lang="en-US" smtClean="0"/>
               <a:pPr/>
-              <a:t>10/30/2012</a:t>
+              <a:t>10/31/2012</a:t>
             </a:fld>
             <a:endParaRPr lang="en-US"/>
           </a:p>
@@ -14892,7 +14892,7 @@
             <a:fld id="{46F4E5E0-CC8A-4447-8D98-8F21A5814697}" type="datetimeFigureOut">
               <a:rPr lang="en-US" smtClean="0"/>
               <a:pPr/>
-              <a:t>10/30/2012</a:t>
+              <a:t>10/31/2012</a:t>
             </a:fld>
             <a:endParaRPr lang="en-US"/>
           </a:p>
@@ -16264,7 +16264,23 @@
                   <a:srgbClr val="FF0000"/>
                 </a:solidFill>
               </a:rPr>
-              <a:t> el funcionamiento de las notificaciones de documentos de cuadrilla por vencer, mostrando los bonitos colores, y lo propio para los permisos de los sitios, </a:t>
+              <a:t> el funcionamiento de las notificaciones de documentos de cuadrilla por vencer, mostrando los bonitos </a:t>
+            </a:r>
+            <a:r>
+              <a:rPr lang="es-ES" sz="1700" smtClean="0">
+                <a:solidFill>
+                  <a:srgbClr val="FF0000"/>
+                </a:solidFill>
+              </a:rPr>
+              <a:t>colores</a:t>
+            </a:r>
+            <a:r>
+              <a:rPr lang="es-ES" sz="1700" smtClean="0">
+                <a:solidFill>
+                  <a:srgbClr val="FF0000"/>
+                </a:solidFill>
+              </a:rPr>
+              <a:t>, </a:t>
             </a:r>
             <a:r>
               <a:rPr lang="es-ES" sz="1700" dirty="0" err="1" smtClean="0">
@@ -18339,11 +18355,7 @@
           <a:p>
             <a:r>
               <a:rPr lang="es-ES" sz="3600" dirty="0" smtClean="0"/>
-              <a:t>Gestión de </a:t>
-            </a:r>
-            <a:r>
-              <a:rPr lang="es-ES" sz="3600" dirty="0" smtClean="0"/>
-              <a:t>Herramientas.</a:t>
+              <a:t>Gestión de Herramientas.</a:t>
             </a:r>
           </a:p>
           <a:p>
@@ -18352,11 +18364,7 @@
           <a:p>
             <a:r>
               <a:rPr lang="es-ES" sz="3600" dirty="0" smtClean="0"/>
-              <a:t>Gestión </a:t>
-            </a:r>
-            <a:r>
-              <a:rPr lang="es-ES" sz="3600" dirty="0" smtClean="0"/>
-              <a:t>de Materiales.</a:t>
+              <a:t>Gestión de Materiales.</a:t>
             </a:r>
           </a:p>
           <a:p>
@@ -18375,7 +18383,6 @@
               <a:rPr lang="es-ES" sz="3600" dirty="0" smtClean="0"/>
               <a:t>e informes.</a:t>
             </a:r>
-            <a:endParaRPr lang="es-ES" sz="3600" dirty="0" smtClean="0"/>
           </a:p>
           <a:p>
             <a:endParaRPr lang="es-AR" dirty="0"/>

</xml_diff>